<commit_message>
week 18 activities and homework, updating solutions through week 17
</commit_message>
<xml_diff>
--- a/02-lesson-plans/part-time/16-Week/Project-Resources/Slide-Shows/DataProject.pptx
+++ b/02-lesson-plans/part-time/16-Week/Project-Resources/Slide-Shows/DataProject.pptx
@@ -148,10 +148,6 @@
 </p:presentation>
 </file>
 
-<file path=ppt/revisionInfo.xml><?xml version="1.0" encoding="utf-8"?>
-<p1510:revInfo xmlns:a="http://schemas.openxmlformats.org/drawingml/2006/main" xmlns:r="http://schemas.openxmlformats.org/officeDocument/2006/relationships" xmlns:p1510="http://schemas.microsoft.com/office/powerpoint/2015/10/main"/>
-</file>
-
 <file path=ppt/handoutMasters/handoutMaster1.xml><?xml version="1.0" encoding="utf-8"?>
 <p:handoutMaster xmlns:a="http://schemas.openxmlformats.org/drawingml/2006/main" xmlns:r="http://schemas.openxmlformats.org/officeDocument/2006/relationships" xmlns:p="http://schemas.openxmlformats.org/presentationml/2006/main">
   <p:cSld>
@@ -234,7 +230,7 @@
           <a:p>
             <a:fld id="{51A969EA-8566-418D-AC96-BC5F6E9FAB6C}" type="datetimeFigureOut">
               <a:rPr lang="en-US" smtClean="0"/>
-              <a:t>1/22/18</a:t>
+              <a:t>5/17/2018</a:t>
             </a:fld>
             <a:endParaRPr lang="en-US"/>
           </a:p>
@@ -399,7 +395,7 @@
           <a:p>
             <a:fld id="{33B07B4B-74D8-4C42-A719-1F93879497F8}" type="datetimeFigureOut">
               <a:rPr lang="en-US" smtClean="0"/>
-              <a:t>1/22/18</a:t>
+              <a:t>5/17/2018</a:t>
             </a:fld>
             <a:endParaRPr lang="en-US"/>
           </a:p>
@@ -834,18 +830,7 @@
                 <a:ea typeface="Roboto" panose="02000000000000000000" pitchFamily="2" charset="0"/>
                 <a:cs typeface="Arial" panose="020B0604020202020204" pitchFamily="34" charset="0"/>
               </a:rPr>
-              <a:t>The Coding </a:t>
-            </a:r>
-            <a:r>
-              <a:rPr lang="en-US" sz="2000" b="1" dirty="0" smtClean="0">
-                <a:solidFill>
-                  <a:schemeClr val="bg1"/>
-                </a:solidFill>
-                <a:latin typeface="Arial" panose="020B0604020202020204" pitchFamily="34" charset="0"/>
-                <a:ea typeface="Roboto" panose="02000000000000000000" pitchFamily="2" charset="0"/>
-                <a:cs typeface="Arial" panose="020B0604020202020204" pitchFamily="34" charset="0"/>
-              </a:rPr>
-              <a:t>Bootcamp</a:t>
+              <a:t>The Coding Bootcamp</a:t>
             </a:r>
             <a:endParaRPr lang="en-US" sz="2000" dirty="0">
               <a:solidFill>
@@ -1466,7 +1451,7 @@
           <a:p>
             <a:fld id="{B65C9255-9F07-4181-9AD2-897FFC0A3B7E}" type="datetimeFigureOut">
               <a:rPr lang="en-US" smtClean="0"/>
-              <a:t>1/22/18</a:t>
+              <a:t>5/17/2018</a:t>
             </a:fld>
             <a:endParaRPr lang="en-US"/>
           </a:p>
@@ -2278,29 +2263,12 @@
                 <a:latin typeface="Arial" panose="020B0604020202020204" pitchFamily="34" charset="0"/>
                 <a:cs typeface="Arial" panose="020B0604020202020204" pitchFamily="34" charset="0"/>
               </a:rPr>
-              <a:t>To build some </a:t>
-            </a:r>
-            <a:r>
-              <a:rPr lang="en-US" sz="4000" b="1" i="1" u="sng" dirty="0">
-                <a:latin typeface="Arial" panose="020B0604020202020204" pitchFamily="34" charset="0"/>
-                <a:cs typeface="Arial" panose="020B0604020202020204" pitchFamily="34" charset="0"/>
-              </a:rPr>
-              <a:t>awesome </a:t>
-            </a:r>
-            <a:r>
-              <a:rPr lang="en-US" sz="4000" b="1" i="1" u="sng" dirty="0" err="1">
-                <a:latin typeface="Arial" panose="020B0604020202020204" pitchFamily="34" charset="0"/>
-                <a:cs typeface="Arial" panose="020B0604020202020204" pitchFamily="34" charset="0"/>
-              </a:rPr>
-              <a:t>shiz</a:t>
-            </a:r>
-            <a:r>
-              <a:rPr lang="en-US" sz="4000" b="1" i="1" u="sng" dirty="0">
-                <a:latin typeface="Arial" panose="020B0604020202020204" pitchFamily="34" charset="0"/>
-                <a:cs typeface="Arial" panose="020B0604020202020204" pitchFamily="34" charset="0"/>
-              </a:rPr>
-              <a:t>.</a:t>
-            </a:r>
+              <a:t>To build a great project!</a:t>
+            </a:r>
+            <a:endParaRPr lang="en-US" sz="4000" b="1" i="1" u="sng" dirty="0">
+              <a:latin typeface="Arial" panose="020B0604020202020204" pitchFamily="34" charset="0"/>
+              <a:cs typeface="Arial" panose="020B0604020202020204" pitchFamily="34" charset="0"/>
+            </a:endParaRPr>
           </a:p>
         </p:txBody>
       </p:sp>
@@ -2386,7 +2354,7 @@
         <p:spPr>
           <a:xfrm>
             <a:off x="304799" y="762000"/>
-            <a:ext cx="8730343" cy="5632311"/>
+            <a:ext cx="8730343" cy="5078313"/>
           </a:xfrm>
           <a:prstGeom prst="rect">
             <a:avLst/>
@@ -2511,43 +2479,6 @@
             </a:r>
           </a:p>
           <a:p>
-            <a:pPr marL="342900" indent="-342900">
-              <a:buFont typeface="Arial" panose="020B0604020202020204" pitchFamily="34" charset="0"/>
-              <a:buChar char="•"/>
-            </a:pPr>
-            <a:endParaRPr lang="en-US" b="1" u="sng" dirty="0">
-              <a:latin typeface="Arial" panose="020B0604020202020204" pitchFamily="34" charset="0"/>
-              <a:ea typeface="Roboto" pitchFamily="2" charset="0"/>
-              <a:cs typeface="Arial" panose="020B0604020202020204" pitchFamily="34" charset="0"/>
-            </a:endParaRPr>
-          </a:p>
-          <a:p>
-            <a:pPr marL="342900" indent="-342900">
-              <a:buFont typeface="Arial" panose="020B0604020202020204" pitchFamily="34" charset="0"/>
-              <a:buChar char="•"/>
-            </a:pPr>
-            <a:r>
-              <a:rPr lang="en-US" b="1" dirty="0">
-                <a:latin typeface="Arial" panose="020B0604020202020204" pitchFamily="34" charset="0"/>
-                <a:ea typeface="Roboto" pitchFamily="2" charset="0"/>
-                <a:cs typeface="Arial" panose="020B0604020202020204" pitchFamily="34" charset="0"/>
-              </a:rPr>
-              <a:t>Must incorporate </a:t>
-            </a:r>
-            <a:r>
-              <a:rPr lang="en-US" b="1" u="sng" dirty="0">
-                <a:latin typeface="Arial" panose="020B0604020202020204" pitchFamily="34" charset="0"/>
-                <a:ea typeface="Roboto" pitchFamily="2" charset="0"/>
-                <a:cs typeface="Arial" panose="020B0604020202020204" pitchFamily="34" charset="0"/>
-              </a:rPr>
-              <a:t>Basic Testing Framework </a:t>
-            </a:r>
-          </a:p>
-          <a:p>
-            <a:pPr marL="342900" indent="-342900">
-              <a:buFont typeface="Arial" panose="020B0604020202020204" pitchFamily="34" charset="0"/>
-              <a:buChar char="•"/>
-            </a:pPr>
             <a:endParaRPr lang="en-US" b="1" u="sng" dirty="0">
               <a:latin typeface="Arial" panose="020B0604020202020204" pitchFamily="34" charset="0"/>
               <a:ea typeface="Roboto" pitchFamily="2" charset="0"/>

</xml_diff>